<commit_message>
Reactive service changes and logging changes
</commit_message>
<xml_diff>
--- a/BookMyShow_Design.pptx
+++ b/BookMyShow_Design.pptx
@@ -12,6 +12,11 @@
     <p:sldId id="261" r:id="rId6"/>
     <p:sldId id="259" r:id="rId7"/>
     <p:sldId id="260" r:id="rId8"/>
+    <p:sldId id="263" r:id="rId9"/>
+    <p:sldId id="264" r:id="rId10"/>
+    <p:sldId id="265" r:id="rId11"/>
+    <p:sldId id="266" r:id="rId12"/>
+    <p:sldId id="267" r:id="rId13"/>
   </p:sldIdLst>
   <p:sldSz cx="12192000" cy="6858000"/>
   <p:notesSz cx="6858000" cy="9144000"/>
@@ -267,7 +272,7 @@
           <a:p>
             <a:fld id="{B5907C38-14D4-4C2C-8A20-234F79DC1A8C}" type="datetimeFigureOut">
               <a:rPr lang="en-IN" smtClean="0"/>
-              <a:t>10-07-2025</a:t>
+              <a:t>25-07-2025</a:t>
             </a:fld>
             <a:endParaRPr lang="en-IN"/>
           </a:p>
@@ -467,7 +472,7 @@
           <a:p>
             <a:fld id="{B5907C38-14D4-4C2C-8A20-234F79DC1A8C}" type="datetimeFigureOut">
               <a:rPr lang="en-IN" smtClean="0"/>
-              <a:t>10-07-2025</a:t>
+              <a:t>25-07-2025</a:t>
             </a:fld>
             <a:endParaRPr lang="en-IN"/>
           </a:p>
@@ -677,7 +682,7 @@
           <a:p>
             <a:fld id="{B5907C38-14D4-4C2C-8A20-234F79DC1A8C}" type="datetimeFigureOut">
               <a:rPr lang="en-IN" smtClean="0"/>
-              <a:t>10-07-2025</a:t>
+              <a:t>25-07-2025</a:t>
             </a:fld>
             <a:endParaRPr lang="en-IN"/>
           </a:p>
@@ -877,7 +882,7 @@
           <a:p>
             <a:fld id="{B5907C38-14D4-4C2C-8A20-234F79DC1A8C}" type="datetimeFigureOut">
               <a:rPr lang="en-IN" smtClean="0"/>
-              <a:t>10-07-2025</a:t>
+              <a:t>25-07-2025</a:t>
             </a:fld>
             <a:endParaRPr lang="en-IN"/>
           </a:p>
@@ -1153,7 +1158,7 @@
           <a:p>
             <a:fld id="{B5907C38-14D4-4C2C-8A20-234F79DC1A8C}" type="datetimeFigureOut">
               <a:rPr lang="en-IN" smtClean="0"/>
-              <a:t>10-07-2025</a:t>
+              <a:t>25-07-2025</a:t>
             </a:fld>
             <a:endParaRPr lang="en-IN"/>
           </a:p>
@@ -1421,7 +1426,7 @@
           <a:p>
             <a:fld id="{B5907C38-14D4-4C2C-8A20-234F79DC1A8C}" type="datetimeFigureOut">
               <a:rPr lang="en-IN" smtClean="0"/>
-              <a:t>10-07-2025</a:t>
+              <a:t>25-07-2025</a:t>
             </a:fld>
             <a:endParaRPr lang="en-IN"/>
           </a:p>
@@ -1836,7 +1841,7 @@
           <a:p>
             <a:fld id="{B5907C38-14D4-4C2C-8A20-234F79DC1A8C}" type="datetimeFigureOut">
               <a:rPr lang="en-IN" smtClean="0"/>
-              <a:t>10-07-2025</a:t>
+              <a:t>25-07-2025</a:t>
             </a:fld>
             <a:endParaRPr lang="en-IN"/>
           </a:p>
@@ -1978,7 +1983,7 @@
           <a:p>
             <a:fld id="{B5907C38-14D4-4C2C-8A20-234F79DC1A8C}" type="datetimeFigureOut">
               <a:rPr lang="en-IN" smtClean="0"/>
-              <a:t>10-07-2025</a:t>
+              <a:t>25-07-2025</a:t>
             </a:fld>
             <a:endParaRPr lang="en-IN"/>
           </a:p>
@@ -2091,7 +2096,7 @@
           <a:p>
             <a:fld id="{B5907C38-14D4-4C2C-8A20-234F79DC1A8C}" type="datetimeFigureOut">
               <a:rPr lang="en-IN" smtClean="0"/>
-              <a:t>10-07-2025</a:t>
+              <a:t>25-07-2025</a:t>
             </a:fld>
             <a:endParaRPr lang="en-IN"/>
           </a:p>
@@ -2404,7 +2409,7 @@
           <a:p>
             <a:fld id="{B5907C38-14D4-4C2C-8A20-234F79DC1A8C}" type="datetimeFigureOut">
               <a:rPr lang="en-IN" smtClean="0"/>
-              <a:t>10-07-2025</a:t>
+              <a:t>25-07-2025</a:t>
             </a:fld>
             <a:endParaRPr lang="en-IN"/>
           </a:p>
@@ -2693,7 +2698,7 @@
           <a:p>
             <a:fld id="{B5907C38-14D4-4C2C-8A20-234F79DC1A8C}" type="datetimeFigureOut">
               <a:rPr lang="en-IN" smtClean="0"/>
-              <a:t>10-07-2025</a:t>
+              <a:t>25-07-2025</a:t>
             </a:fld>
             <a:endParaRPr lang="en-IN"/>
           </a:p>
@@ -2936,7 +2941,7 @@
           <a:p>
             <a:fld id="{B5907C38-14D4-4C2C-8A20-234F79DC1A8C}" type="datetimeFigureOut">
               <a:rPr lang="en-IN" smtClean="0"/>
-              <a:t>10-07-2025</a:t>
+              <a:t>25-07-2025</a:t>
             </a:fld>
             <a:endParaRPr lang="en-IN"/>
           </a:p>
@@ -3430,6 +3435,186 @@
 </p:sld>
 </file>
 
+<file path=ppt/slides/slide10.xml><?xml version="1.0" encoding="utf-8"?>
+<p:sld xmlns:a="http://schemas.openxmlformats.org/drawingml/2006/main" xmlns:r="http://schemas.openxmlformats.org/officeDocument/2006/relationships" xmlns:p="http://schemas.openxmlformats.org/presentationml/2006/main">
+  <p:cSld>
+    <p:spTree>
+      <p:nvGrpSpPr>
+        <p:cNvPr id="1" name=""/>
+        <p:cNvGrpSpPr/>
+        <p:nvPr/>
+      </p:nvGrpSpPr>
+      <p:grpSpPr>
+        <a:xfrm>
+          <a:off x="0" y="0"/>
+          <a:ext cx="0" cy="0"/>
+          <a:chOff x="0" y="0"/>
+          <a:chExt cx="0" cy="0"/>
+        </a:xfrm>
+      </p:grpSpPr>
+      <p:pic>
+        <p:nvPicPr>
+          <p:cNvPr id="3" name="Picture 2">
+            <a:extLst>
+              <a:ext uri="{FF2B5EF4-FFF2-40B4-BE49-F238E27FC236}">
+                <a16:creationId xmlns:a16="http://schemas.microsoft.com/office/drawing/2014/main" id="{F2E83E72-06AF-8DF8-7F62-BDC0175C357E}"/>
+              </a:ext>
+            </a:extLst>
+          </p:cNvPr>
+          <p:cNvPicPr>
+            <a:picLocks noChangeAspect="1"/>
+          </p:cNvPicPr>
+          <p:nvPr/>
+        </p:nvPicPr>
+        <p:blipFill>
+          <a:blip r:embed="rId2"/>
+          <a:stretch>
+            <a:fillRect/>
+          </a:stretch>
+        </p:blipFill>
+        <p:spPr>
+          <a:xfrm>
+            <a:off x="0" y="959563"/>
+            <a:ext cx="12192000" cy="4938873"/>
+          </a:xfrm>
+          <a:prstGeom prst="rect">
+            <a:avLst/>
+          </a:prstGeom>
+        </p:spPr>
+      </p:pic>
+    </p:spTree>
+    <p:extLst>
+      <p:ext uri="{BB962C8B-B14F-4D97-AF65-F5344CB8AC3E}">
+        <p14:creationId xmlns:p14="http://schemas.microsoft.com/office/powerpoint/2010/main" val="3357590707"/>
+      </p:ext>
+    </p:extLst>
+  </p:cSld>
+  <p:clrMapOvr>
+    <a:masterClrMapping/>
+  </p:clrMapOvr>
+</p:sld>
+</file>
+
+<file path=ppt/slides/slide11.xml><?xml version="1.0" encoding="utf-8"?>
+<p:sld xmlns:a="http://schemas.openxmlformats.org/drawingml/2006/main" xmlns:r="http://schemas.openxmlformats.org/officeDocument/2006/relationships" xmlns:p="http://schemas.openxmlformats.org/presentationml/2006/main">
+  <p:cSld>
+    <p:spTree>
+      <p:nvGrpSpPr>
+        <p:cNvPr id="1" name=""/>
+        <p:cNvGrpSpPr/>
+        <p:nvPr/>
+      </p:nvGrpSpPr>
+      <p:grpSpPr>
+        <a:xfrm>
+          <a:off x="0" y="0"/>
+          <a:ext cx="0" cy="0"/>
+          <a:chOff x="0" y="0"/>
+          <a:chExt cx="0" cy="0"/>
+        </a:xfrm>
+      </p:grpSpPr>
+      <p:pic>
+        <p:nvPicPr>
+          <p:cNvPr id="3" name="Picture 2">
+            <a:extLst>
+              <a:ext uri="{FF2B5EF4-FFF2-40B4-BE49-F238E27FC236}">
+                <a16:creationId xmlns:a16="http://schemas.microsoft.com/office/drawing/2014/main" id="{10614097-AA1D-F974-A4ED-7B1E469B9F8B}"/>
+              </a:ext>
+            </a:extLst>
+          </p:cNvPr>
+          <p:cNvPicPr>
+            <a:picLocks noChangeAspect="1"/>
+          </p:cNvPicPr>
+          <p:nvPr/>
+        </p:nvPicPr>
+        <p:blipFill>
+          <a:blip r:embed="rId2"/>
+          <a:stretch>
+            <a:fillRect/>
+          </a:stretch>
+        </p:blipFill>
+        <p:spPr>
+          <a:xfrm>
+            <a:off x="0" y="1027847"/>
+            <a:ext cx="12192000" cy="4802305"/>
+          </a:xfrm>
+          <a:prstGeom prst="rect">
+            <a:avLst/>
+          </a:prstGeom>
+        </p:spPr>
+      </p:pic>
+    </p:spTree>
+    <p:extLst>
+      <p:ext uri="{BB962C8B-B14F-4D97-AF65-F5344CB8AC3E}">
+        <p14:creationId xmlns:p14="http://schemas.microsoft.com/office/powerpoint/2010/main" val="2959913457"/>
+      </p:ext>
+    </p:extLst>
+  </p:cSld>
+  <p:clrMapOvr>
+    <a:masterClrMapping/>
+  </p:clrMapOvr>
+</p:sld>
+</file>
+
+<file path=ppt/slides/slide12.xml><?xml version="1.0" encoding="utf-8"?>
+<p:sld xmlns:a="http://schemas.openxmlformats.org/drawingml/2006/main" xmlns:r="http://schemas.openxmlformats.org/officeDocument/2006/relationships" xmlns:p="http://schemas.openxmlformats.org/presentationml/2006/main">
+  <p:cSld>
+    <p:spTree>
+      <p:nvGrpSpPr>
+        <p:cNvPr id="1" name=""/>
+        <p:cNvGrpSpPr/>
+        <p:nvPr/>
+      </p:nvGrpSpPr>
+      <p:grpSpPr>
+        <a:xfrm>
+          <a:off x="0" y="0"/>
+          <a:ext cx="0" cy="0"/>
+          <a:chOff x="0" y="0"/>
+          <a:chExt cx="0" cy="0"/>
+        </a:xfrm>
+      </p:grpSpPr>
+      <p:pic>
+        <p:nvPicPr>
+          <p:cNvPr id="3" name="Picture 2">
+            <a:extLst>
+              <a:ext uri="{FF2B5EF4-FFF2-40B4-BE49-F238E27FC236}">
+                <a16:creationId xmlns:a16="http://schemas.microsoft.com/office/drawing/2014/main" id="{32EA6094-657D-C582-3B28-A12BA162D24E}"/>
+              </a:ext>
+            </a:extLst>
+          </p:cNvPr>
+          <p:cNvPicPr>
+            <a:picLocks noChangeAspect="1"/>
+          </p:cNvPicPr>
+          <p:nvPr/>
+        </p:nvPicPr>
+        <p:blipFill>
+          <a:blip r:embed="rId2"/>
+          <a:stretch>
+            <a:fillRect/>
+          </a:stretch>
+        </p:blipFill>
+        <p:spPr>
+          <a:xfrm>
+            <a:off x="2468565" y="2434504"/>
+            <a:ext cx="7254869" cy="1988992"/>
+          </a:xfrm>
+          <a:prstGeom prst="rect">
+            <a:avLst/>
+          </a:prstGeom>
+        </p:spPr>
+      </p:pic>
+    </p:spTree>
+    <p:extLst>
+      <p:ext uri="{BB962C8B-B14F-4D97-AF65-F5344CB8AC3E}">
+        <p14:creationId xmlns:p14="http://schemas.microsoft.com/office/powerpoint/2010/main" val="2439465677"/>
+      </p:ext>
+    </p:extLst>
+  </p:cSld>
+  <p:clrMapOvr>
+    <a:masterClrMapping/>
+  </p:clrMapOvr>
+</p:sld>
+</file>
+
 <file path=ppt/slides/slide2.xml><?xml version="1.0" encoding="utf-8"?>
 <p:sld xmlns:a="http://schemas.openxmlformats.org/drawingml/2006/main" xmlns:r="http://schemas.openxmlformats.org/officeDocument/2006/relationships" xmlns:p="http://schemas.openxmlformats.org/presentationml/2006/main">
   <p:cSld>
@@ -7403,6 +7588,155 @@
     <p:extLst>
       <p:ext uri="{BB962C8B-B14F-4D97-AF65-F5344CB8AC3E}">
         <p14:creationId xmlns:p14="http://schemas.microsoft.com/office/powerpoint/2010/main" val="2230876567"/>
+      </p:ext>
+    </p:extLst>
+  </p:cSld>
+  <p:clrMapOvr>
+    <a:masterClrMapping/>
+  </p:clrMapOvr>
+</p:sld>
+</file>
+
+<file path=ppt/slides/slide8.xml><?xml version="1.0" encoding="utf-8"?>
+<p:sld xmlns:a="http://schemas.openxmlformats.org/drawingml/2006/main" xmlns:r="http://schemas.openxmlformats.org/officeDocument/2006/relationships" xmlns:p="http://schemas.openxmlformats.org/presentationml/2006/main">
+  <p:cSld>
+    <p:spTree>
+      <p:nvGrpSpPr>
+        <p:cNvPr id="1" name=""/>
+        <p:cNvGrpSpPr/>
+        <p:nvPr/>
+      </p:nvGrpSpPr>
+      <p:grpSpPr>
+        <a:xfrm>
+          <a:off x="0" y="0"/>
+          <a:ext cx="0" cy="0"/>
+          <a:chOff x="0" y="0"/>
+          <a:chExt cx="0" cy="0"/>
+        </a:xfrm>
+      </p:grpSpPr>
+      <p:sp>
+        <p:nvSpPr>
+          <p:cNvPr id="2" name="Title 1">
+            <a:extLst>
+              <a:ext uri="{FF2B5EF4-FFF2-40B4-BE49-F238E27FC236}">
+                <a16:creationId xmlns:a16="http://schemas.microsoft.com/office/drawing/2014/main" id="{6D2B06EC-C027-F12C-83EC-F69DB2C48C5A}"/>
+              </a:ext>
+            </a:extLst>
+          </p:cNvPr>
+          <p:cNvSpPr>
+            <a:spLocks noGrp="1"/>
+          </p:cNvSpPr>
+          <p:nvPr>
+            <p:ph type="title"/>
+          </p:nvPr>
+        </p:nvSpPr>
+        <p:spPr/>
+        <p:txBody>
+          <a:bodyPr/>
+          <a:lstStyle/>
+          <a:p>
+            <a:r>
+              <a:rPr lang="en-US" dirty="0"/>
+              <a:t>Book my show app - output</a:t>
+            </a:r>
+            <a:endParaRPr lang="en-IN" dirty="0"/>
+          </a:p>
+        </p:txBody>
+      </p:sp>
+      <p:pic>
+        <p:nvPicPr>
+          <p:cNvPr id="4" name="Picture 3">
+            <a:extLst>
+              <a:ext uri="{FF2B5EF4-FFF2-40B4-BE49-F238E27FC236}">
+                <a16:creationId xmlns:a16="http://schemas.microsoft.com/office/drawing/2014/main" id="{41B7D1E6-2B8F-4C84-884D-61936D163B67}"/>
+              </a:ext>
+            </a:extLst>
+          </p:cNvPr>
+          <p:cNvPicPr>
+            <a:picLocks noChangeAspect="1"/>
+          </p:cNvPicPr>
+          <p:nvPr/>
+        </p:nvPicPr>
+        <p:blipFill>
+          <a:blip r:embed="rId2"/>
+          <a:stretch>
+            <a:fillRect/>
+          </a:stretch>
+        </p:blipFill>
+        <p:spPr>
+          <a:xfrm>
+            <a:off x="226624" y="1690688"/>
+            <a:ext cx="11514818" cy="4320914"/>
+          </a:xfrm>
+          <a:prstGeom prst="rect">
+            <a:avLst/>
+          </a:prstGeom>
+        </p:spPr>
+      </p:pic>
+    </p:spTree>
+    <p:extLst>
+      <p:ext uri="{BB962C8B-B14F-4D97-AF65-F5344CB8AC3E}">
+        <p14:creationId xmlns:p14="http://schemas.microsoft.com/office/powerpoint/2010/main" val="3253766253"/>
+      </p:ext>
+    </p:extLst>
+  </p:cSld>
+  <p:clrMapOvr>
+    <a:masterClrMapping/>
+  </p:clrMapOvr>
+</p:sld>
+</file>
+
+<file path=ppt/slides/slide9.xml><?xml version="1.0" encoding="utf-8"?>
+<p:sld xmlns:a="http://schemas.openxmlformats.org/drawingml/2006/main" xmlns:r="http://schemas.openxmlformats.org/officeDocument/2006/relationships" xmlns:p="http://schemas.openxmlformats.org/presentationml/2006/main">
+  <p:cSld>
+    <p:spTree>
+      <p:nvGrpSpPr>
+        <p:cNvPr id="1" name=""/>
+        <p:cNvGrpSpPr/>
+        <p:nvPr/>
+      </p:nvGrpSpPr>
+      <p:grpSpPr>
+        <a:xfrm>
+          <a:off x="0" y="0"/>
+          <a:ext cx="0" cy="0"/>
+          <a:chOff x="0" y="0"/>
+          <a:chExt cx="0" cy="0"/>
+        </a:xfrm>
+      </p:grpSpPr>
+      <p:pic>
+        <p:nvPicPr>
+          <p:cNvPr id="3" name="Picture 2">
+            <a:extLst>
+              <a:ext uri="{FF2B5EF4-FFF2-40B4-BE49-F238E27FC236}">
+                <a16:creationId xmlns:a16="http://schemas.microsoft.com/office/drawing/2014/main" id="{2F6EA226-CAE8-1218-9E4D-E031EA27B4D7}"/>
+              </a:ext>
+            </a:extLst>
+          </p:cNvPr>
+          <p:cNvPicPr>
+            <a:picLocks noChangeAspect="1"/>
+          </p:cNvPicPr>
+          <p:nvPr/>
+        </p:nvPicPr>
+        <p:blipFill>
+          <a:blip r:embed="rId2"/>
+          <a:stretch>
+            <a:fillRect/>
+          </a:stretch>
+        </p:blipFill>
+        <p:spPr>
+          <a:xfrm>
+            <a:off x="1268311" y="338822"/>
+            <a:ext cx="9655377" cy="6180356"/>
+          </a:xfrm>
+          <a:prstGeom prst="rect">
+            <a:avLst/>
+          </a:prstGeom>
+        </p:spPr>
+      </p:pic>
+    </p:spTree>
+    <p:extLst>
+      <p:ext uri="{BB962C8B-B14F-4D97-AF65-F5344CB8AC3E}">
+        <p14:creationId xmlns:p14="http://schemas.microsoft.com/office/powerpoint/2010/main" val="1652792297"/>
       </p:ext>
     </p:extLst>
   </p:cSld>

</xml_diff>